<commit_message>
Project 3 - Reporting Updates
</commit_message>
<xml_diff>
--- a/Students/johnlusher/Project_3/ECEN689_Project_3_John_Lusher.pptx
+++ b/Students/johnlusher/Project_3/ECEN689_Project_3_John_Lusher.pptx
@@ -325,7 +325,7 @@
               <a:pPr>
                 <a:defRPr/>
               </a:pPr>
-              <a:t>4/29/2016</a:t>
+              <a:t>4/30/2016</a:t>
             </a:fld>
             <a:endParaRPr lang="en-US" dirty="0"/>
           </a:p>
@@ -21999,7 +21999,7 @@
             <a:fld id="{CB2467DD-8BC4-48D8-80A6-513BF04402DC}" type="datetimeFigureOut">
               <a:rPr lang="en-US" smtClean="0"/>
               <a:pPr/>
-              <a:t>4/29/2016</a:t>
+              <a:t>4/30/2016</a:t>
             </a:fld>
             <a:endParaRPr lang="en-US"/>
           </a:p>
@@ -22171,7 +22171,7 @@
             <a:fld id="{CB2467DD-8BC4-48D8-80A6-513BF04402DC}" type="datetimeFigureOut">
               <a:rPr lang="en-US" smtClean="0"/>
               <a:pPr/>
-              <a:t>4/29/2016</a:t>
+              <a:t>4/30/2016</a:t>
             </a:fld>
             <a:endParaRPr lang="en-US"/>
           </a:p>
@@ -22435,7 +22435,7 @@
             <a:fld id="{CB2467DD-8BC4-48D8-80A6-513BF04402DC}" type="datetimeFigureOut">
               <a:rPr lang="en-US" smtClean="0"/>
               <a:pPr/>
-              <a:t>4/29/2016</a:t>
+              <a:t>4/30/2016</a:t>
             </a:fld>
             <a:endParaRPr lang="en-US"/>
           </a:p>
@@ -22680,7 +22680,7 @@
             <a:fld id="{CB2467DD-8BC4-48D8-80A6-513BF04402DC}" type="datetimeFigureOut">
               <a:rPr lang="en-US" smtClean="0"/>
               <a:pPr/>
-              <a:t>4/29/2016</a:t>
+              <a:t>4/30/2016</a:t>
             </a:fld>
             <a:endParaRPr lang="en-US"/>
           </a:p>
@@ -23039,7 +23039,7 @@
             <a:fld id="{CB2467DD-8BC4-48D8-80A6-513BF04402DC}" type="datetimeFigureOut">
               <a:rPr lang="en-US" smtClean="0"/>
               <a:pPr/>
-              <a:t>4/29/2016</a:t>
+              <a:t>4/30/2016</a:t>
             </a:fld>
             <a:endParaRPr lang="en-US"/>
           </a:p>
@@ -23170,7 +23170,7 @@
             <a:fld id="{CB2467DD-8BC4-48D8-80A6-513BF04402DC}" type="datetimeFigureOut">
               <a:rPr lang="en-US" smtClean="0"/>
               <a:pPr/>
-              <a:t>4/29/2016</a:t>
+              <a:t>4/30/2016</a:t>
             </a:fld>
             <a:endParaRPr lang="en-US"/>
           </a:p>
@@ -23300,7 +23300,7 @@
             <a:fld id="{CB2467DD-8BC4-48D8-80A6-513BF04402DC}" type="datetimeFigureOut">
               <a:rPr lang="en-US" smtClean="0"/>
               <a:pPr/>
-              <a:t>4/29/2016</a:t>
+              <a:t>4/30/2016</a:t>
             </a:fld>
             <a:endParaRPr lang="en-US"/>
           </a:p>
@@ -23761,7 +23761,7 @@
             <a:fld id="{CB2467DD-8BC4-48D8-80A6-513BF04402DC}" type="datetimeFigureOut">
               <a:rPr lang="en-US" smtClean="0"/>
               <a:pPr/>
-              <a:t>4/29/2016</a:t>
+              <a:t>4/30/2016</a:t>
             </a:fld>
             <a:endParaRPr lang="en-US"/>
           </a:p>
@@ -24038,7 +24038,7 @@
             <a:fld id="{CB2467DD-8BC4-48D8-80A6-513BF04402DC}" type="datetimeFigureOut">
               <a:rPr lang="en-US" smtClean="0"/>
               <a:pPr/>
-              <a:t>4/29/2016</a:t>
+              <a:t>4/30/2016</a:t>
             </a:fld>
             <a:endParaRPr lang="en-US"/>
           </a:p>
@@ -24220,7 +24220,7 @@
             <a:fld id="{CB2467DD-8BC4-48D8-80A6-513BF04402DC}" type="datetimeFigureOut">
               <a:rPr lang="en-US" smtClean="0"/>
               <a:pPr/>
-              <a:t>4/29/2016</a:t>
+              <a:t>4/30/2016</a:t>
             </a:fld>
             <a:endParaRPr lang="en-US"/>
           </a:p>
@@ -24411,7 +24411,7 @@
             <a:fld id="{CB2467DD-8BC4-48D8-80A6-513BF04402DC}" type="datetimeFigureOut">
               <a:rPr lang="en-US" smtClean="0"/>
               <a:pPr/>
-              <a:t>4/29/2016</a:t>
+              <a:t>4/30/2016</a:t>
             </a:fld>
             <a:endParaRPr lang="en-US"/>
           </a:p>
@@ -24862,7 +24862,7 @@
             <a:fld id="{CB2467DD-8BC4-48D8-80A6-513BF04402DC}" type="datetimeFigureOut">
               <a:rPr lang="en-US" smtClean="0"/>
               <a:pPr/>
-              <a:t>4/29/2016</a:t>
+              <a:t>4/30/2016</a:t>
             </a:fld>
             <a:endParaRPr lang="en-US"/>
           </a:p>
@@ -25034,7 +25034,7 @@
             <a:fld id="{CB2467DD-8BC4-48D8-80A6-513BF04402DC}" type="datetimeFigureOut">
               <a:rPr lang="en-US" smtClean="0"/>
               <a:pPr/>
-              <a:t>4/29/2016</a:t>
+              <a:t>4/30/2016</a:t>
             </a:fld>
             <a:endParaRPr lang="en-US"/>
           </a:p>
@@ -25298,7 +25298,7 @@
             <a:fld id="{CB2467DD-8BC4-48D8-80A6-513BF04402DC}" type="datetimeFigureOut">
               <a:rPr lang="en-US" smtClean="0"/>
               <a:pPr/>
-              <a:t>4/29/2016</a:t>
+              <a:t>4/30/2016</a:t>
             </a:fld>
             <a:endParaRPr lang="en-US"/>
           </a:p>
@@ -25543,7 +25543,7 @@
             <a:fld id="{CB2467DD-8BC4-48D8-80A6-513BF04402DC}" type="datetimeFigureOut">
               <a:rPr lang="en-US" smtClean="0"/>
               <a:pPr/>
-              <a:t>4/29/2016</a:t>
+              <a:t>4/30/2016</a:t>
             </a:fld>
             <a:endParaRPr lang="en-US"/>
           </a:p>
@@ -25902,7 +25902,7 @@
             <a:fld id="{CB2467DD-8BC4-48D8-80A6-513BF04402DC}" type="datetimeFigureOut">
               <a:rPr lang="en-US" smtClean="0"/>
               <a:pPr/>
-              <a:t>4/29/2016</a:t>
+              <a:t>4/30/2016</a:t>
             </a:fld>
             <a:endParaRPr lang="en-US"/>
           </a:p>
@@ -26220,7 +26220,7 @@
             <a:fld id="{CB2467DD-8BC4-48D8-80A6-513BF04402DC}" type="datetimeFigureOut">
               <a:rPr lang="en-US" smtClean="0"/>
               <a:pPr/>
-              <a:t>4/29/2016</a:t>
+              <a:t>4/30/2016</a:t>
             </a:fld>
             <a:endParaRPr lang="en-US"/>
           </a:p>
@@ -26350,7 +26350,7 @@
             <a:fld id="{CB2467DD-8BC4-48D8-80A6-513BF04402DC}" type="datetimeFigureOut">
               <a:rPr lang="en-US" smtClean="0"/>
               <a:pPr/>
-              <a:t>4/29/2016</a:t>
+              <a:t>4/30/2016</a:t>
             </a:fld>
             <a:endParaRPr lang="en-US"/>
           </a:p>
@@ -26647,7 +26647,7 @@
             <a:fld id="{CB2467DD-8BC4-48D8-80A6-513BF04402DC}" type="datetimeFigureOut">
               <a:rPr lang="en-US" smtClean="0"/>
               <a:pPr/>
-              <a:t>4/29/2016</a:t>
+              <a:t>4/30/2016</a:t>
             </a:fld>
             <a:endParaRPr lang="en-US"/>
           </a:p>
@@ -26924,7 +26924,7 @@
             <a:fld id="{CB2467DD-8BC4-48D8-80A6-513BF04402DC}" type="datetimeFigureOut">
               <a:rPr lang="en-US" smtClean="0"/>
               <a:pPr/>
-              <a:t>4/29/2016</a:t>
+              <a:t>4/30/2016</a:t>
             </a:fld>
             <a:endParaRPr lang="en-US"/>
           </a:p>
@@ -27106,7 +27106,7 @@
             <a:fld id="{CB2467DD-8BC4-48D8-80A6-513BF04402DC}" type="datetimeFigureOut">
               <a:rPr lang="en-US" smtClean="0"/>
               <a:pPr/>
-              <a:t>4/29/2016</a:t>
+              <a:t>4/30/2016</a:t>
             </a:fld>
             <a:endParaRPr lang="en-US"/>
           </a:p>
@@ -27297,7 +27297,7 @@
             <a:fld id="{CB2467DD-8BC4-48D8-80A6-513BF04402DC}" type="datetimeFigureOut">
               <a:rPr lang="en-US" smtClean="0"/>
               <a:pPr/>
-              <a:t>4/29/2016</a:t>
+              <a:t>4/30/2016</a:t>
             </a:fld>
             <a:endParaRPr lang="en-US"/>
           </a:p>
@@ -27813,7 +27813,7 @@
             <a:fld id="{CB2467DD-8BC4-48D8-80A6-513BF04402DC}" type="datetimeFigureOut">
               <a:rPr lang="en-US" smtClean="0"/>
               <a:pPr/>
-              <a:t>4/29/2016</a:t>
+              <a:t>4/30/2016</a:t>
             </a:fld>
             <a:endParaRPr lang="en-US"/>
           </a:p>
@@ -28007,7 +28007,7 @@
             <a:fld id="{CB2467DD-8BC4-48D8-80A6-513BF04402DC}" type="datetimeFigureOut">
               <a:rPr lang="en-US" smtClean="0"/>
               <a:pPr/>
-              <a:t>4/29/2016</a:t>
+              <a:t>4/30/2016</a:t>
             </a:fld>
             <a:endParaRPr lang="en-US"/>
           </a:p>
@@ -28274,7 +28274,7 @@
             <a:fld id="{CB2467DD-8BC4-48D8-80A6-513BF04402DC}" type="datetimeFigureOut">
               <a:rPr lang="en-US" smtClean="0"/>
               <a:pPr/>
-              <a:t>4/29/2016</a:t>
+              <a:t>4/30/2016</a:t>
             </a:fld>
             <a:endParaRPr lang="en-US"/>
           </a:p>
@@ -28894,7 +28894,7 @@
             <a:fld id="{CB2467DD-8BC4-48D8-80A6-513BF04402DC}" type="datetimeFigureOut">
               <a:rPr lang="en-US" smtClean="0"/>
               <a:pPr/>
-              <a:t>4/29/2016</a:t>
+              <a:t>4/30/2016</a:t>
             </a:fld>
             <a:endParaRPr lang="en-US"/>
           </a:p>
@@ -29327,7 +29327,7 @@
             <a:fld id="{CB2467DD-8BC4-48D8-80A6-513BF04402DC}" type="datetimeFigureOut">
               <a:rPr lang="en-US" smtClean="0"/>
               <a:pPr/>
-              <a:t>4/29/2016</a:t>
+              <a:t>4/30/2016</a:t>
             </a:fld>
             <a:endParaRPr lang="en-US"/>
           </a:p>
@@ -29458,7 +29458,7 @@
             <a:fld id="{CB2467DD-8BC4-48D8-80A6-513BF04402DC}" type="datetimeFigureOut">
               <a:rPr lang="en-US" smtClean="0"/>
               <a:pPr/>
-              <a:t>4/29/2016</a:t>
+              <a:t>4/30/2016</a:t>
             </a:fld>
             <a:endParaRPr lang="en-US"/>
           </a:p>
@@ -29566,7 +29566,7 @@
             <a:fld id="{CB2467DD-8BC4-48D8-80A6-513BF04402DC}" type="datetimeFigureOut">
               <a:rPr lang="en-US" smtClean="0"/>
               <a:pPr/>
-              <a:t>4/29/2016</a:t>
+              <a:t>4/30/2016</a:t>
             </a:fld>
             <a:endParaRPr lang="en-US"/>
           </a:p>
@@ -29866,7 +29866,7 @@
             <a:fld id="{CB2467DD-8BC4-48D8-80A6-513BF04402DC}" type="datetimeFigureOut">
               <a:rPr lang="en-US" smtClean="0"/>
               <a:pPr/>
-              <a:t>4/29/2016</a:t>
+              <a:t>4/30/2016</a:t>
             </a:fld>
             <a:endParaRPr lang="en-US"/>
           </a:p>
@@ -30201,7 +30201,7 @@
             <a:fld id="{CB2467DD-8BC4-48D8-80A6-513BF04402DC}" type="datetimeFigureOut">
               <a:rPr lang="en-US" smtClean="0"/>
               <a:pPr/>
-              <a:t>4/29/2016</a:t>
+              <a:t>4/30/2016</a:t>
             </a:fld>
             <a:endParaRPr lang="en-US"/>
           </a:p>
@@ -30384,7 +30384,7 @@
             <a:fld id="{CB2467DD-8BC4-48D8-80A6-513BF04402DC}" type="datetimeFigureOut">
               <a:rPr lang="en-US" smtClean="0"/>
               <a:pPr/>
-              <a:t>4/29/2016</a:t>
+              <a:t>4/30/2016</a:t>
             </a:fld>
             <a:endParaRPr lang="en-US"/>
           </a:p>
@@ -30577,7 +30577,7 @@
             <a:fld id="{CB2467DD-8BC4-48D8-80A6-513BF04402DC}" type="datetimeFigureOut">
               <a:rPr lang="en-US" smtClean="0"/>
               <a:pPr/>
-              <a:t>4/29/2016</a:t>
+              <a:t>4/30/2016</a:t>
             </a:fld>
             <a:endParaRPr lang="en-US"/>
           </a:p>
@@ -33076,7 +33076,7 @@
             <a:fld id="{5586B75A-687E-405C-8A0B-8D00578BA2C3}" type="datetime1">
               <a:rPr lang="en-US" smtClean="0"/>
               <a:pPr/>
-              <a:t>4/29/2016</a:t>
+              <a:t>4/30/2016</a:t>
             </a:fld>
             <a:endParaRPr lang="en-US"/>
           </a:p>
@@ -33621,7 +33621,7 @@
             <a:fld id="{5586B75A-687E-405C-8A0B-8D00578BA2C3}" type="datetime1">
               <a:rPr lang="en-US" smtClean="0"/>
               <a:pPr/>
-              <a:t>4/29/2016</a:t>
+              <a:t>4/30/2016</a:t>
             </a:fld>
             <a:endParaRPr lang="en-US"/>
           </a:p>
@@ -34206,7 +34206,7 @@
             <a:fld id="{E28077EF-3DB9-4852-A8C8-9AA18A70A9F8}" type="datetimeFigureOut">
               <a:rPr lang="en-US" dirty="0"/>
               <a:pPr/>
-              <a:t>4/29/2016</a:t>
+              <a:t>4/30/2016</a:t>
             </a:fld>
             <a:endParaRPr lang="en-US" dirty="0"/>
           </a:p>
@@ -41196,7 +41196,7 @@
                 </a:solidFill>
                 <a:latin typeface="Myriad Pro" panose="020B0503030403020204" pitchFamily="34" charset="0"/>
               </a:rPr>
-              <a:t> One to use to collect data as well</a:t>
+              <a:t> One to use to collect data</a:t>
             </a:r>
           </a:p>
         </p:txBody>
@@ -42989,6 +42989,43 @@
                 <a:cs typeface="+mn-cs"/>
               </a:rPr>
               <a:t> library to communications</a:t>
+            </a:r>
+          </a:p>
+          <a:p>
+            <a:pPr marL="342900" indent="-342900" eaLnBrk="0" hangingPunct="0">
+              <a:spcBef>
+                <a:spcPct val="20000"/>
+              </a:spcBef>
+              <a:buFont typeface="Arial" charset="0"/>
+              <a:buChar char="•"/>
+              <a:defRPr/>
+            </a:pPr>
+            <a:endParaRPr lang="en-US" sz="1500" kern="0" dirty="0">
+              <a:solidFill>
+                <a:srgbClr val="4F4F4F"/>
+              </a:solidFill>
+              <a:latin typeface="Myriad Pro" panose="020B0503030403020204" pitchFamily="34" charset="0"/>
+              <a:cs typeface="+mn-cs"/>
+            </a:endParaRPr>
+          </a:p>
+          <a:p>
+            <a:pPr marL="342900" indent="-342900" eaLnBrk="0" hangingPunct="0">
+              <a:spcBef>
+                <a:spcPct val="20000"/>
+              </a:spcBef>
+              <a:buFont typeface="Arial" charset="0"/>
+              <a:buChar char="•"/>
+              <a:defRPr/>
+            </a:pPr>
+            <a:r>
+              <a:rPr lang="en-US" sz="1500" kern="0" dirty="0">
+                <a:solidFill>
+                  <a:srgbClr val="4F4F4F"/>
+                </a:solidFill>
+                <a:latin typeface="Myriad Pro" panose="020B0503030403020204" pitchFamily="34" charset="0"/>
+                <a:cs typeface="+mn-cs"/>
+              </a:rPr>
+              <a:t>Support for up to three devices is now supported.</a:t>
             </a:r>
           </a:p>
           <a:p>

</xml_diff>

<commit_message>
Project 3 - Final Update
</commit_message>
<xml_diff>
--- a/Students/johnlusher/Project_3/ECEN689_Project_3_John_Lusher.pptx
+++ b/Students/johnlusher/Project_3/ECEN689_Project_3_John_Lusher.pptx
@@ -325,7 +325,7 @@
               <a:pPr>
                 <a:defRPr/>
               </a:pPr>
-              <a:t>4/30/2016</a:t>
+              <a:t>5/2/2016</a:t>
             </a:fld>
             <a:endParaRPr lang="en-US" dirty="0"/>
           </a:p>
@@ -21999,7 +21999,7 @@
             <a:fld id="{CB2467DD-8BC4-48D8-80A6-513BF04402DC}" type="datetimeFigureOut">
               <a:rPr lang="en-US" smtClean="0"/>
               <a:pPr/>
-              <a:t>4/30/2016</a:t>
+              <a:t>5/2/2016</a:t>
             </a:fld>
             <a:endParaRPr lang="en-US"/>
           </a:p>
@@ -22171,7 +22171,7 @@
             <a:fld id="{CB2467DD-8BC4-48D8-80A6-513BF04402DC}" type="datetimeFigureOut">
               <a:rPr lang="en-US" smtClean="0"/>
               <a:pPr/>
-              <a:t>4/30/2016</a:t>
+              <a:t>5/2/2016</a:t>
             </a:fld>
             <a:endParaRPr lang="en-US"/>
           </a:p>
@@ -22435,7 +22435,7 @@
             <a:fld id="{CB2467DD-8BC4-48D8-80A6-513BF04402DC}" type="datetimeFigureOut">
               <a:rPr lang="en-US" smtClean="0"/>
               <a:pPr/>
-              <a:t>4/30/2016</a:t>
+              <a:t>5/2/2016</a:t>
             </a:fld>
             <a:endParaRPr lang="en-US"/>
           </a:p>
@@ -22680,7 +22680,7 @@
             <a:fld id="{CB2467DD-8BC4-48D8-80A6-513BF04402DC}" type="datetimeFigureOut">
               <a:rPr lang="en-US" smtClean="0"/>
               <a:pPr/>
-              <a:t>4/30/2016</a:t>
+              <a:t>5/2/2016</a:t>
             </a:fld>
             <a:endParaRPr lang="en-US"/>
           </a:p>
@@ -23039,7 +23039,7 @@
             <a:fld id="{CB2467DD-8BC4-48D8-80A6-513BF04402DC}" type="datetimeFigureOut">
               <a:rPr lang="en-US" smtClean="0"/>
               <a:pPr/>
-              <a:t>4/30/2016</a:t>
+              <a:t>5/2/2016</a:t>
             </a:fld>
             <a:endParaRPr lang="en-US"/>
           </a:p>
@@ -23170,7 +23170,7 @@
             <a:fld id="{CB2467DD-8BC4-48D8-80A6-513BF04402DC}" type="datetimeFigureOut">
               <a:rPr lang="en-US" smtClean="0"/>
               <a:pPr/>
-              <a:t>4/30/2016</a:t>
+              <a:t>5/2/2016</a:t>
             </a:fld>
             <a:endParaRPr lang="en-US"/>
           </a:p>
@@ -23300,7 +23300,7 @@
             <a:fld id="{CB2467DD-8BC4-48D8-80A6-513BF04402DC}" type="datetimeFigureOut">
               <a:rPr lang="en-US" smtClean="0"/>
               <a:pPr/>
-              <a:t>4/30/2016</a:t>
+              <a:t>5/2/2016</a:t>
             </a:fld>
             <a:endParaRPr lang="en-US"/>
           </a:p>
@@ -23761,7 +23761,7 @@
             <a:fld id="{CB2467DD-8BC4-48D8-80A6-513BF04402DC}" type="datetimeFigureOut">
               <a:rPr lang="en-US" smtClean="0"/>
               <a:pPr/>
-              <a:t>4/30/2016</a:t>
+              <a:t>5/2/2016</a:t>
             </a:fld>
             <a:endParaRPr lang="en-US"/>
           </a:p>
@@ -24038,7 +24038,7 @@
             <a:fld id="{CB2467DD-8BC4-48D8-80A6-513BF04402DC}" type="datetimeFigureOut">
               <a:rPr lang="en-US" smtClean="0"/>
               <a:pPr/>
-              <a:t>4/30/2016</a:t>
+              <a:t>5/2/2016</a:t>
             </a:fld>
             <a:endParaRPr lang="en-US"/>
           </a:p>
@@ -24220,7 +24220,7 @@
             <a:fld id="{CB2467DD-8BC4-48D8-80A6-513BF04402DC}" type="datetimeFigureOut">
               <a:rPr lang="en-US" smtClean="0"/>
               <a:pPr/>
-              <a:t>4/30/2016</a:t>
+              <a:t>5/2/2016</a:t>
             </a:fld>
             <a:endParaRPr lang="en-US"/>
           </a:p>
@@ -24411,7 +24411,7 @@
             <a:fld id="{CB2467DD-8BC4-48D8-80A6-513BF04402DC}" type="datetimeFigureOut">
               <a:rPr lang="en-US" smtClean="0"/>
               <a:pPr/>
-              <a:t>4/30/2016</a:t>
+              <a:t>5/2/2016</a:t>
             </a:fld>
             <a:endParaRPr lang="en-US"/>
           </a:p>
@@ -24862,7 +24862,7 @@
             <a:fld id="{CB2467DD-8BC4-48D8-80A6-513BF04402DC}" type="datetimeFigureOut">
               <a:rPr lang="en-US" smtClean="0"/>
               <a:pPr/>
-              <a:t>4/30/2016</a:t>
+              <a:t>5/2/2016</a:t>
             </a:fld>
             <a:endParaRPr lang="en-US"/>
           </a:p>
@@ -25034,7 +25034,7 @@
             <a:fld id="{CB2467DD-8BC4-48D8-80A6-513BF04402DC}" type="datetimeFigureOut">
               <a:rPr lang="en-US" smtClean="0"/>
               <a:pPr/>
-              <a:t>4/30/2016</a:t>
+              <a:t>5/2/2016</a:t>
             </a:fld>
             <a:endParaRPr lang="en-US"/>
           </a:p>
@@ -25298,7 +25298,7 @@
             <a:fld id="{CB2467DD-8BC4-48D8-80A6-513BF04402DC}" type="datetimeFigureOut">
               <a:rPr lang="en-US" smtClean="0"/>
               <a:pPr/>
-              <a:t>4/30/2016</a:t>
+              <a:t>5/2/2016</a:t>
             </a:fld>
             <a:endParaRPr lang="en-US"/>
           </a:p>
@@ -25543,7 +25543,7 @@
             <a:fld id="{CB2467DD-8BC4-48D8-80A6-513BF04402DC}" type="datetimeFigureOut">
               <a:rPr lang="en-US" smtClean="0"/>
               <a:pPr/>
-              <a:t>4/30/2016</a:t>
+              <a:t>5/2/2016</a:t>
             </a:fld>
             <a:endParaRPr lang="en-US"/>
           </a:p>
@@ -25902,7 +25902,7 @@
             <a:fld id="{CB2467DD-8BC4-48D8-80A6-513BF04402DC}" type="datetimeFigureOut">
               <a:rPr lang="en-US" smtClean="0"/>
               <a:pPr/>
-              <a:t>4/30/2016</a:t>
+              <a:t>5/2/2016</a:t>
             </a:fld>
             <a:endParaRPr lang="en-US"/>
           </a:p>
@@ -26220,7 +26220,7 @@
             <a:fld id="{CB2467DD-8BC4-48D8-80A6-513BF04402DC}" type="datetimeFigureOut">
               <a:rPr lang="en-US" smtClean="0"/>
               <a:pPr/>
-              <a:t>4/30/2016</a:t>
+              <a:t>5/2/2016</a:t>
             </a:fld>
             <a:endParaRPr lang="en-US"/>
           </a:p>
@@ -26350,7 +26350,7 @@
             <a:fld id="{CB2467DD-8BC4-48D8-80A6-513BF04402DC}" type="datetimeFigureOut">
               <a:rPr lang="en-US" smtClean="0"/>
               <a:pPr/>
-              <a:t>4/30/2016</a:t>
+              <a:t>5/2/2016</a:t>
             </a:fld>
             <a:endParaRPr lang="en-US"/>
           </a:p>
@@ -26647,7 +26647,7 @@
             <a:fld id="{CB2467DD-8BC4-48D8-80A6-513BF04402DC}" type="datetimeFigureOut">
               <a:rPr lang="en-US" smtClean="0"/>
               <a:pPr/>
-              <a:t>4/30/2016</a:t>
+              <a:t>5/2/2016</a:t>
             </a:fld>
             <a:endParaRPr lang="en-US"/>
           </a:p>
@@ -26924,7 +26924,7 @@
             <a:fld id="{CB2467DD-8BC4-48D8-80A6-513BF04402DC}" type="datetimeFigureOut">
               <a:rPr lang="en-US" smtClean="0"/>
               <a:pPr/>
-              <a:t>4/30/2016</a:t>
+              <a:t>5/2/2016</a:t>
             </a:fld>
             <a:endParaRPr lang="en-US"/>
           </a:p>
@@ -27106,7 +27106,7 @@
             <a:fld id="{CB2467DD-8BC4-48D8-80A6-513BF04402DC}" type="datetimeFigureOut">
               <a:rPr lang="en-US" smtClean="0"/>
               <a:pPr/>
-              <a:t>4/30/2016</a:t>
+              <a:t>5/2/2016</a:t>
             </a:fld>
             <a:endParaRPr lang="en-US"/>
           </a:p>
@@ -27297,7 +27297,7 @@
             <a:fld id="{CB2467DD-8BC4-48D8-80A6-513BF04402DC}" type="datetimeFigureOut">
               <a:rPr lang="en-US" smtClean="0"/>
               <a:pPr/>
-              <a:t>4/30/2016</a:t>
+              <a:t>5/2/2016</a:t>
             </a:fld>
             <a:endParaRPr lang="en-US"/>
           </a:p>
@@ -27813,7 +27813,7 @@
             <a:fld id="{CB2467DD-8BC4-48D8-80A6-513BF04402DC}" type="datetimeFigureOut">
               <a:rPr lang="en-US" smtClean="0"/>
               <a:pPr/>
-              <a:t>4/30/2016</a:t>
+              <a:t>5/2/2016</a:t>
             </a:fld>
             <a:endParaRPr lang="en-US"/>
           </a:p>
@@ -28007,7 +28007,7 @@
             <a:fld id="{CB2467DD-8BC4-48D8-80A6-513BF04402DC}" type="datetimeFigureOut">
               <a:rPr lang="en-US" smtClean="0"/>
               <a:pPr/>
-              <a:t>4/30/2016</a:t>
+              <a:t>5/2/2016</a:t>
             </a:fld>
             <a:endParaRPr lang="en-US"/>
           </a:p>
@@ -28274,7 +28274,7 @@
             <a:fld id="{CB2467DD-8BC4-48D8-80A6-513BF04402DC}" type="datetimeFigureOut">
               <a:rPr lang="en-US" smtClean="0"/>
               <a:pPr/>
-              <a:t>4/30/2016</a:t>
+              <a:t>5/2/2016</a:t>
             </a:fld>
             <a:endParaRPr lang="en-US"/>
           </a:p>
@@ -28894,7 +28894,7 @@
             <a:fld id="{CB2467DD-8BC4-48D8-80A6-513BF04402DC}" type="datetimeFigureOut">
               <a:rPr lang="en-US" smtClean="0"/>
               <a:pPr/>
-              <a:t>4/30/2016</a:t>
+              <a:t>5/2/2016</a:t>
             </a:fld>
             <a:endParaRPr lang="en-US"/>
           </a:p>
@@ -29327,7 +29327,7 @@
             <a:fld id="{CB2467DD-8BC4-48D8-80A6-513BF04402DC}" type="datetimeFigureOut">
               <a:rPr lang="en-US" smtClean="0"/>
               <a:pPr/>
-              <a:t>4/30/2016</a:t>
+              <a:t>5/2/2016</a:t>
             </a:fld>
             <a:endParaRPr lang="en-US"/>
           </a:p>
@@ -29458,7 +29458,7 @@
             <a:fld id="{CB2467DD-8BC4-48D8-80A6-513BF04402DC}" type="datetimeFigureOut">
               <a:rPr lang="en-US" smtClean="0"/>
               <a:pPr/>
-              <a:t>4/30/2016</a:t>
+              <a:t>5/2/2016</a:t>
             </a:fld>
             <a:endParaRPr lang="en-US"/>
           </a:p>
@@ -29566,7 +29566,7 @@
             <a:fld id="{CB2467DD-8BC4-48D8-80A6-513BF04402DC}" type="datetimeFigureOut">
               <a:rPr lang="en-US" smtClean="0"/>
               <a:pPr/>
-              <a:t>4/30/2016</a:t>
+              <a:t>5/2/2016</a:t>
             </a:fld>
             <a:endParaRPr lang="en-US"/>
           </a:p>
@@ -29866,7 +29866,7 @@
             <a:fld id="{CB2467DD-8BC4-48D8-80A6-513BF04402DC}" type="datetimeFigureOut">
               <a:rPr lang="en-US" smtClean="0"/>
               <a:pPr/>
-              <a:t>4/30/2016</a:t>
+              <a:t>5/2/2016</a:t>
             </a:fld>
             <a:endParaRPr lang="en-US"/>
           </a:p>
@@ -30201,7 +30201,7 @@
             <a:fld id="{CB2467DD-8BC4-48D8-80A6-513BF04402DC}" type="datetimeFigureOut">
               <a:rPr lang="en-US" smtClean="0"/>
               <a:pPr/>
-              <a:t>4/30/2016</a:t>
+              <a:t>5/2/2016</a:t>
             </a:fld>
             <a:endParaRPr lang="en-US"/>
           </a:p>
@@ -30384,7 +30384,7 @@
             <a:fld id="{CB2467DD-8BC4-48D8-80A6-513BF04402DC}" type="datetimeFigureOut">
               <a:rPr lang="en-US" smtClean="0"/>
               <a:pPr/>
-              <a:t>4/30/2016</a:t>
+              <a:t>5/2/2016</a:t>
             </a:fld>
             <a:endParaRPr lang="en-US"/>
           </a:p>
@@ -30577,7 +30577,7 @@
             <a:fld id="{CB2467DD-8BC4-48D8-80A6-513BF04402DC}" type="datetimeFigureOut">
               <a:rPr lang="en-US" smtClean="0"/>
               <a:pPr/>
-              <a:t>4/30/2016</a:t>
+              <a:t>5/2/2016</a:t>
             </a:fld>
             <a:endParaRPr lang="en-US"/>
           </a:p>
@@ -33076,7 +33076,7 @@
             <a:fld id="{5586B75A-687E-405C-8A0B-8D00578BA2C3}" type="datetime1">
               <a:rPr lang="en-US" smtClean="0"/>
               <a:pPr/>
-              <a:t>4/30/2016</a:t>
+              <a:t>5/2/2016</a:t>
             </a:fld>
             <a:endParaRPr lang="en-US"/>
           </a:p>
@@ -33621,7 +33621,7 @@
             <a:fld id="{5586B75A-687E-405C-8A0B-8D00578BA2C3}" type="datetime1">
               <a:rPr lang="en-US" smtClean="0"/>
               <a:pPr/>
-              <a:t>4/30/2016</a:t>
+              <a:t>5/2/2016</a:t>
             </a:fld>
             <a:endParaRPr lang="en-US"/>
           </a:p>
@@ -34206,7 +34206,7 @@
             <a:fld id="{E28077EF-3DB9-4852-A8C8-9AA18A70A9F8}" type="datetimeFigureOut">
               <a:rPr lang="en-US" dirty="0"/>
               <a:pPr/>
-              <a:t>4/30/2016</a:t>
+              <a:t>5/2/2016</a:t>
             </a:fld>
             <a:endParaRPr lang="en-US" dirty="0"/>
           </a:p>
@@ -43463,8 +43463,8 @@
         </p:blipFill>
         <p:spPr>
           <a:xfrm>
-            <a:off x="4528418" y="192964"/>
-            <a:ext cx="3646652" cy="6482939"/>
+            <a:off x="4528418" y="192965"/>
+            <a:ext cx="3646652" cy="6482936"/>
           </a:xfrm>
           <a:prstGeom prst="rect">
             <a:avLst/>

</xml_diff>